<commit_message>
Added Misc_and_Drafts folder with some draft slides.
</commit_message>
<xml_diff>
--- a/2-meaningful-names.pptx
+++ b/2-meaningful-names.pptx
@@ -234,7 +234,7 @@
             <a:fld id="{A9F97C9E-53CF-4710-B4F7-20A7039B9428}" type="datetimeFigureOut">
               <a:rPr lang="el-GR" smtClean="0"/>
               <a:pPr/>
-              <a:t>29/9/2022</a:t>
+              <a:t>4/10/2023</a:t>
             </a:fld>
             <a:endParaRPr lang="el-GR"/>
           </a:p>
@@ -396,7 +396,7 @@
             <a:fld id="{DC17DF70-03C8-4BDB-82BF-9C076E474B74}" type="datetimeFigureOut">
               <a:rPr lang="el-GR" smtClean="0"/>
               <a:pPr/>
-              <a:t>29/9/2022</a:t>
+              <a:t>4/10/2023</a:t>
             </a:fld>
             <a:endParaRPr lang="el-GR"/>
           </a:p>
@@ -1878,7 +1878,7 @@
             <a:fld id="{1D8BD707-D9CF-40AE-B4C6-C98DA3205C09}" type="datetimeFigureOut">
               <a:rPr lang="en-US" smtClean="0"/>
               <a:pPr/>
-              <a:t>9/29/2022</a:t>
+              <a:t>10/4/2023</a:t>
             </a:fld>
             <a:endParaRPr lang="en-US"/>
           </a:p>
@@ -2239,7 +2239,7 @@
             <a:fld id="{1D8BD707-D9CF-40AE-B4C6-C98DA3205C09}" type="datetimeFigureOut">
               <a:rPr lang="en-US" smtClean="0"/>
               <a:pPr/>
-              <a:t>9/29/2022</a:t>
+              <a:t>10/4/2023</a:t>
             </a:fld>
             <a:endParaRPr lang="en-US"/>
           </a:p>
@@ -2416,7 +2416,7 @@
             <a:fld id="{1D8BD707-D9CF-40AE-B4C6-C98DA3205C09}" type="datetimeFigureOut">
               <a:rPr lang="en-US" smtClean="0"/>
               <a:pPr/>
-              <a:t>9/29/2022</a:t>
+              <a:t>10/4/2023</a:t>
             </a:fld>
             <a:endParaRPr lang="en-US"/>
           </a:p>
@@ -2653,7 +2653,7 @@
             <a:fld id="{1D8BD707-D9CF-40AE-B4C6-C98DA3205C09}" type="datetimeFigureOut">
               <a:rPr lang="en-US" smtClean="0"/>
               <a:pPr/>
-              <a:t>9/29/2022</a:t>
+              <a:t>10/4/2023</a:t>
             </a:fld>
             <a:endParaRPr lang="en-US"/>
           </a:p>
@@ -2924,7 +2924,7 @@
             <a:fld id="{1D8BD707-D9CF-40AE-B4C6-C98DA3205C09}" type="datetimeFigureOut">
               <a:rPr lang="en-US" smtClean="0"/>
               <a:pPr/>
-              <a:t>9/29/2022</a:t>
+              <a:t>10/4/2023</a:t>
             </a:fld>
             <a:endParaRPr lang="en-US"/>
           </a:p>
@@ -3146,7 +3146,7 @@
             <a:fld id="{1D8BD707-D9CF-40AE-B4C6-C98DA3205C09}" type="datetimeFigureOut">
               <a:rPr lang="en-US" smtClean="0"/>
               <a:pPr/>
-              <a:t>9/29/2022</a:t>
+              <a:t>10/4/2023</a:t>
             </a:fld>
             <a:endParaRPr lang="en-US"/>
           </a:p>
@@ -3500,7 +3500,7 @@
             <a:fld id="{1D8BD707-D9CF-40AE-B4C6-C98DA3205C09}" type="datetimeFigureOut">
               <a:rPr lang="en-US" smtClean="0"/>
               <a:pPr/>
-              <a:t>9/29/2022</a:t>
+              <a:t>10/4/2023</a:t>
             </a:fld>
             <a:endParaRPr lang="en-US"/>
           </a:p>
@@ -3734,7 +3734,7 @@
             <a:fld id="{1D8BD707-D9CF-40AE-B4C6-C98DA3205C09}" type="datetimeFigureOut">
               <a:rPr lang="en-US" smtClean="0"/>
               <a:pPr/>
-              <a:t>9/29/2022</a:t>
+              <a:t>10/4/2023</a:t>
             </a:fld>
             <a:endParaRPr lang="en-US"/>
           </a:p>
@@ -3876,7 +3876,7 @@
             <a:fld id="{1D8BD707-D9CF-40AE-B4C6-C98DA3205C09}" type="datetimeFigureOut">
               <a:rPr lang="en-US" smtClean="0"/>
               <a:pPr/>
-              <a:t>9/29/2022</a:t>
+              <a:t>10/4/2023</a:t>
             </a:fld>
             <a:endParaRPr lang="en-US"/>
           </a:p>
@@ -4155,7 +4155,7 @@
             <a:fld id="{1D8BD707-D9CF-40AE-B4C6-C98DA3205C09}" type="datetimeFigureOut">
               <a:rPr lang="en-US" smtClean="0"/>
               <a:pPr/>
-              <a:t>9/29/2022</a:t>
+              <a:t>10/4/2023</a:t>
             </a:fld>
             <a:endParaRPr lang="en-US"/>
           </a:p>
@@ -4564,7 +4564,7 @@
             <a:fld id="{1D8BD707-D9CF-40AE-B4C6-C98DA3205C09}" type="datetimeFigureOut">
               <a:rPr lang="en-US" smtClean="0"/>
               <a:pPr/>
-              <a:t>9/29/2022</a:t>
+              <a:t>10/4/2023</a:t>
             </a:fld>
             <a:endParaRPr lang="en-US"/>
           </a:p>
@@ -4904,7 +4904,7 @@
             <a:fld id="{1D8BD707-D9CF-40AE-B4C6-C98DA3205C09}" type="datetimeFigureOut">
               <a:rPr lang="en-US" smtClean="0"/>
               <a:pPr/>
-              <a:t>9/29/2022</a:t>
+              <a:t>10/4/2023</a:t>
             </a:fld>
             <a:endParaRPr lang="en-US"/>
           </a:p>
@@ -5620,24 +5620,14 @@
           </a:p>
           <a:p>
             <a:r>
-              <a:rPr lang="fr-FR" b="1" smtClean="0">
-                <a:solidFill>
-                  <a:srgbClr val="000099"/>
-                </a:solidFill>
-                <a:latin typeface="Courier New" pitchFamily="49" charset="0"/>
-                <a:cs typeface="Courier New" pitchFamily="49" charset="0"/>
-              </a:rPr>
-              <a:t>for </a:t>
-            </a:r>
-            <a:r>
-              <a:rPr lang="fr-FR" b="1" dirty="0" smtClean="0">
-                <a:solidFill>
-                  <a:srgbClr val="000099"/>
-                </a:solidFill>
-                <a:latin typeface="Courier New" pitchFamily="49" charset="0"/>
-                <a:cs typeface="Courier New" pitchFamily="49" charset="0"/>
-              </a:rPr>
-              <a:t>(</a:t>
+              <a:rPr lang="fr-FR" b="1" dirty="0" smtClean="0">
+                <a:solidFill>
+                  <a:srgbClr val="000099"/>
+                </a:solidFill>
+                <a:latin typeface="Courier New" pitchFamily="49" charset="0"/>
+                <a:cs typeface="Courier New" pitchFamily="49" charset="0"/>
+              </a:rPr>
+              <a:t>for (</a:t>
             </a:r>
             <a:r>
               <a:rPr lang="fr-FR" b="1" dirty="0" err="1" smtClean="0">
@@ -9044,7 +9034,7 @@
         <p:spPr>
           <a:xfrm>
             <a:off x="609600" y="1481079"/>
-            <a:ext cx="7315200" cy="2862322"/>
+            <a:ext cx="7315200" cy="2308324"/>
           </a:xfrm>
           <a:prstGeom prst="rect">
             <a:avLst/>
@@ -9170,14 +9160,25 @@
             </a:endParaRPr>
           </a:p>
           <a:p>
-            <a:r>
-              <a:rPr lang="fr-FR" dirty="0" smtClean="0">
-                <a:latin typeface="Courier New" pitchFamily="49" charset="0"/>
-                <a:cs typeface="Courier New" pitchFamily="49" charset="0"/>
-              </a:rPr>
-              <a:t> </a:t>
-            </a:r>
-            <a:endParaRPr lang="en-US" dirty="0" smtClean="0">
+            <a:endParaRPr lang="fr-FR" dirty="0" smtClean="0">
+              <a:latin typeface="Courier New" pitchFamily="49" charset="0"/>
+              <a:cs typeface="Courier New" pitchFamily="49" charset="0"/>
+            </a:endParaRPr>
+          </a:p>
+          <a:p>
+            <a:r>
+              <a:rPr lang="en-US" b="1" dirty="0" smtClean="0">
+                <a:solidFill>
+                  <a:srgbClr val="000099"/>
+                </a:solidFill>
+                <a:latin typeface="Courier New" pitchFamily="49" charset="0"/>
+                <a:cs typeface="Courier New" pitchFamily="49" charset="0"/>
+              </a:rPr>
+              <a:t>Exception e;</a:t>
+            </a:r>
+          </a:p>
+          <a:p>
+            <a:endParaRPr lang="en-US" b="1" dirty="0" smtClean="0">
               <a:solidFill>
                 <a:srgbClr val="000099"/>
               </a:solidFill>
@@ -9187,59 +9188,27 @@
           </a:p>
           <a:p>
             <a:r>
-              <a:rPr lang="fr-FR" b="1" dirty="0" smtClean="0">
-                <a:solidFill>
-                  <a:srgbClr val="000099"/>
-                </a:solidFill>
-                <a:latin typeface="Courier New" pitchFamily="49" charset="0"/>
-                <a:cs typeface="Courier New" pitchFamily="49" charset="0"/>
-              </a:rPr>
-              <a:t>class Customer {</a:t>
-            </a:r>
-          </a:p>
-          <a:p>
-            <a:r>
-              <a:rPr lang="fr-FR" b="1" dirty="0" smtClean="0">
-                <a:solidFill>
-                  <a:srgbClr val="000099"/>
-                </a:solidFill>
-                <a:latin typeface="Courier New" pitchFamily="49" charset="0"/>
-                <a:cs typeface="Courier New" pitchFamily="49" charset="0"/>
-              </a:rPr>
-              <a:t>  </a:t>
-            </a:r>
-            <a:r>
-              <a:rPr lang="fr-FR" b="1" dirty="0" err="1" smtClean="0">
-                <a:solidFill>
-                  <a:srgbClr val="000099"/>
-                </a:solidFill>
-                <a:latin typeface="Courier New" pitchFamily="49" charset="0"/>
-                <a:cs typeface="Courier New" pitchFamily="49" charset="0"/>
-              </a:rPr>
-              <a:t>private</a:t>
-            </a:r>
-            <a:r>
-              <a:rPr lang="fr-FR" b="1" dirty="0" smtClean="0">
-                <a:solidFill>
-                  <a:srgbClr val="000099"/>
-                </a:solidFill>
-                <a:latin typeface="Courier New" pitchFamily="49" charset="0"/>
-                <a:cs typeface="Courier New" pitchFamily="49" charset="0"/>
-              </a:rPr>
-              <a:t> Date </a:t>
-            </a:r>
-            <a:r>
-              <a:rPr lang="fr-FR" b="1" dirty="0" err="1" smtClean="0">
-                <a:solidFill>
-                  <a:srgbClr val="000099"/>
-                </a:solidFill>
-                <a:latin typeface="Courier New" pitchFamily="49" charset="0"/>
-                <a:cs typeface="Courier New" pitchFamily="49" charset="0"/>
-              </a:rPr>
-              <a:t>generationTimestamp</a:t>
-            </a:r>
-            <a:r>
-              <a:rPr lang="fr-FR" b="1" dirty="0" smtClean="0">
+              <a:rPr lang="en-US" b="1" dirty="0" smtClean="0">
+                <a:solidFill>
+                  <a:srgbClr val="000099"/>
+                </a:solidFill>
+                <a:latin typeface="Courier New" pitchFamily="49" charset="0"/>
+                <a:cs typeface="Courier New" pitchFamily="49" charset="0"/>
+              </a:rPr>
+              <a:t>Date </a:t>
+            </a:r>
+            <a:r>
+              <a:rPr lang="en-US" b="1" dirty="0" err="1" smtClean="0">
+                <a:solidFill>
+                  <a:srgbClr val="000099"/>
+                </a:solidFill>
+                <a:latin typeface="Courier New" pitchFamily="49" charset="0"/>
+                <a:cs typeface="Courier New" pitchFamily="49" charset="0"/>
+              </a:rPr>
+              <a:t>timestampGeneration</a:t>
+            </a:r>
+            <a:r>
+              <a:rPr lang="en-US" b="1" dirty="0" smtClean="0">
                 <a:solidFill>
                   <a:srgbClr val="000099"/>
                 </a:solidFill>
@@ -9251,58 +9220,6 @@
           </a:p>
           <a:p>
             <a:r>
-              <a:rPr lang="fr-FR" b="1" dirty="0" smtClean="0">
-                <a:solidFill>
-                  <a:srgbClr val="000099"/>
-                </a:solidFill>
-                <a:latin typeface="Courier New" pitchFamily="49" charset="0"/>
-                <a:cs typeface="Courier New" pitchFamily="49" charset="0"/>
-              </a:rPr>
-              <a:t>  </a:t>
-            </a:r>
-            <a:r>
-              <a:rPr lang="fr-FR" b="1" dirty="0" err="1" smtClean="0">
-                <a:solidFill>
-                  <a:srgbClr val="000099"/>
-                </a:solidFill>
-                <a:latin typeface="Courier New" pitchFamily="49" charset="0"/>
-                <a:cs typeface="Courier New" pitchFamily="49" charset="0"/>
-              </a:rPr>
-              <a:t>private</a:t>
-            </a:r>
-            <a:r>
-              <a:rPr lang="fr-FR" b="1" dirty="0" smtClean="0">
-                <a:solidFill>
-                  <a:srgbClr val="000099"/>
-                </a:solidFill>
-                <a:latin typeface="Courier New" pitchFamily="49" charset="0"/>
-                <a:cs typeface="Courier New" pitchFamily="49" charset="0"/>
-              </a:rPr>
-              <a:t> Date </a:t>
-            </a:r>
-            <a:r>
-              <a:rPr lang="fr-FR" b="1" dirty="0" err="1" smtClean="0">
-                <a:solidFill>
-                  <a:srgbClr val="000099"/>
-                </a:solidFill>
-                <a:latin typeface="Courier New" pitchFamily="49" charset="0"/>
-                <a:cs typeface="Courier New" pitchFamily="49" charset="0"/>
-              </a:rPr>
-              <a:t>modificationTimestamp</a:t>
-            </a:r>
-            <a:r>
-              <a:rPr lang="fr-FR" b="1" dirty="0" smtClean="0">
-                <a:solidFill>
-                  <a:srgbClr val="000099"/>
-                </a:solidFill>
-                <a:latin typeface="Courier New" pitchFamily="49" charset="0"/>
-                <a:cs typeface="Courier New" pitchFamily="49" charset="0"/>
-              </a:rPr>
-              <a:t>;;</a:t>
-            </a:r>
-          </a:p>
-          <a:p>
-            <a:r>
               <a:rPr lang="en-US" b="1" dirty="0" smtClean="0">
                 <a:solidFill>
                   <a:srgbClr val="000099"/>
@@ -9310,7 +9227,7 @@
                 <a:latin typeface="Courier New" pitchFamily="49" charset="0"/>
                 <a:cs typeface="Courier New" pitchFamily="49" charset="0"/>
               </a:rPr>
-              <a:t>  private final String </a:t>
+              <a:t>Date </a:t>
             </a:r>
             <a:r>
               <a:rPr lang="en-US" b="1" dirty="0" err="1" smtClean="0">
@@ -9320,7 +9237,7 @@
                 <a:latin typeface="Courier New" pitchFamily="49" charset="0"/>
                 <a:cs typeface="Courier New" pitchFamily="49" charset="0"/>
               </a:rPr>
-              <a:t>recordId</a:t>
+              <a:t>timestampModification</a:t>
             </a:r>
             <a:r>
               <a:rPr lang="en-US" b="1" dirty="0" smtClean="0">
@@ -9330,42 +9247,15 @@
                 <a:latin typeface="Courier New" pitchFamily="49" charset="0"/>
                 <a:cs typeface="Courier New" pitchFamily="49" charset="0"/>
               </a:rPr>
-              <a:t> = "102";</a:t>
-            </a:r>
-          </a:p>
-          <a:p>
-            <a:r>
-              <a:rPr lang="en-US" b="1" dirty="0" smtClean="0">
-                <a:solidFill>
-                  <a:srgbClr val="000099"/>
-                </a:solidFill>
-                <a:latin typeface="Courier New" pitchFamily="49" charset="0"/>
-                <a:cs typeface="Courier New" pitchFamily="49" charset="0"/>
-              </a:rPr>
-              <a:t>  </a:t>
-            </a:r>
-            <a:r>
-              <a:rPr lang="el-GR" b="1" dirty="0" smtClean="0">
-                <a:solidFill>
-                  <a:srgbClr val="000099"/>
-                </a:solidFill>
-                <a:latin typeface="Courier New" pitchFamily="49" charset="0"/>
-                <a:cs typeface="Courier New" pitchFamily="49" charset="0"/>
-              </a:rPr>
-              <a:t>/* ... */</a:t>
-            </a:r>
-          </a:p>
-          <a:p>
-            <a:r>
-              <a:rPr lang="el-GR" b="1" dirty="0" smtClean="0">
-                <a:solidFill>
-                  <a:srgbClr val="000099"/>
-                </a:solidFill>
-                <a:latin typeface="Courier New" pitchFamily="49" charset="0"/>
-                <a:cs typeface="Courier New" pitchFamily="49" charset="0"/>
-              </a:rPr>
-              <a:t>};</a:t>
-            </a:r>
+              <a:t>;</a:t>
+            </a:r>
+            <a:endParaRPr lang="en-US" b="1" dirty="0" smtClean="0">
+              <a:solidFill>
+                <a:srgbClr val="000099"/>
+              </a:solidFill>
+              <a:latin typeface="Courier New" pitchFamily="49" charset="0"/>
+              <a:cs typeface="Courier New" pitchFamily="49" charset="0"/>
+            </a:endParaRPr>
           </a:p>
         </p:txBody>
       </p:sp>
@@ -9426,7 +9316,7 @@
         <p:spPr>
           <a:xfrm>
             <a:off x="609600" y="1481080"/>
-            <a:ext cx="7315200" cy="4524315"/>
+            <a:ext cx="7315200" cy="4247317"/>
           </a:xfrm>
           <a:prstGeom prst="rect">
             <a:avLst/>
@@ -9569,49 +9459,58 @@
           </a:p>
           <a:p>
             <a:r>
-              <a:rPr lang="fr-FR" b="1" dirty="0" smtClean="0">
-                <a:solidFill>
-                  <a:srgbClr val="000099"/>
-                </a:solidFill>
-                <a:latin typeface="Courier New" pitchFamily="49" charset="0"/>
-                <a:cs typeface="Courier New" pitchFamily="49" charset="0"/>
-              </a:rPr>
-              <a:t>class Customer {</a:t>
-            </a:r>
-          </a:p>
-          <a:p>
-            <a:r>
-              <a:rPr lang="fr-FR" b="1" dirty="0" smtClean="0">
-                <a:solidFill>
-                  <a:srgbClr val="000099"/>
-                </a:solidFill>
-                <a:latin typeface="Courier New" pitchFamily="49" charset="0"/>
-                <a:cs typeface="Courier New" pitchFamily="49" charset="0"/>
-              </a:rPr>
-              <a:t>  </a:t>
-            </a:r>
-            <a:r>
-              <a:rPr lang="fr-FR" b="1" dirty="0" err="1" smtClean="0">
-                <a:solidFill>
-                  <a:srgbClr val="000099"/>
-                </a:solidFill>
-                <a:latin typeface="Courier New" pitchFamily="49" charset="0"/>
-                <a:cs typeface="Courier New" pitchFamily="49" charset="0"/>
-              </a:rPr>
-              <a:t>private</a:t>
-            </a:r>
-            <a:r>
-              <a:rPr lang="fr-FR" b="1" dirty="0" smtClean="0">
-                <a:solidFill>
-                  <a:srgbClr val="000099"/>
-                </a:solidFill>
-                <a:latin typeface="Courier New" pitchFamily="49" charset="0"/>
-                <a:cs typeface="Courier New" pitchFamily="49" charset="0"/>
-              </a:rPr>
-              <a:t> Date </a:t>
-            </a:r>
-            <a:r>
-              <a:rPr lang="fr-FR" b="1" dirty="0" err="1" smtClean="0">
+              <a:rPr lang="en-US" b="1" dirty="0" smtClean="0">
+                <a:solidFill>
+                  <a:srgbClr val="000099"/>
+                </a:solidFill>
+                <a:latin typeface="Courier New" pitchFamily="49" charset="0"/>
+                <a:cs typeface="Courier New" pitchFamily="49" charset="0"/>
+              </a:rPr>
+              <a:t>Exception </a:t>
+            </a:r>
+            <a:r>
+              <a:rPr lang="en-US" b="1" dirty="0" err="1" smtClean="0">
+                <a:solidFill>
+                  <a:srgbClr val="000099"/>
+                </a:solidFill>
+                <a:latin typeface="Courier New" pitchFamily="49" charset="0"/>
+                <a:cs typeface="Courier New" pitchFamily="49" charset="0"/>
+              </a:rPr>
+              <a:t>errorInFileOpening</a:t>
+            </a:r>
+            <a:r>
+              <a:rPr lang="en-US" b="1" dirty="0" smtClean="0">
+                <a:solidFill>
+                  <a:srgbClr val="000099"/>
+                </a:solidFill>
+                <a:latin typeface="Courier New" pitchFamily="49" charset="0"/>
+                <a:cs typeface="Courier New" pitchFamily="49" charset="0"/>
+              </a:rPr>
+              <a:t>;</a:t>
+            </a:r>
+          </a:p>
+          <a:p>
+            <a:endParaRPr lang="en-US" b="1" dirty="0" smtClean="0">
+              <a:solidFill>
+                <a:srgbClr val="000099"/>
+              </a:solidFill>
+              <a:latin typeface="Courier New" pitchFamily="49" charset="0"/>
+              <a:cs typeface="Courier New" pitchFamily="49" charset="0"/>
+            </a:endParaRPr>
+          </a:p>
+          <a:p>
+            <a:r>
+              <a:rPr lang="en-US" b="1" dirty="0" smtClean="0">
+                <a:solidFill>
+                  <a:srgbClr val="000099"/>
+                </a:solidFill>
+                <a:latin typeface="Courier New" pitchFamily="49" charset="0"/>
+                <a:cs typeface="Courier New" pitchFamily="49" charset="0"/>
+              </a:rPr>
+              <a:t>Date </a:t>
+            </a:r>
+            <a:r>
+              <a:rPr lang="en-US" b="1" dirty="0" err="1" smtClean="0">
                 <a:solidFill>
                   <a:srgbClr val="000099"/>
                 </a:solidFill>
@@ -9621,7 +9520,7 @@
               <a:t>generationTimestamp</a:t>
             </a:r>
             <a:r>
-              <a:rPr lang="fr-FR" b="1" dirty="0" smtClean="0">
+              <a:rPr lang="en-US" b="1" dirty="0" smtClean="0">
                 <a:solidFill>
                   <a:srgbClr val="000099"/>
                 </a:solidFill>
@@ -9630,58 +9529,13 @@
               </a:rPr>
               <a:t>;</a:t>
             </a:r>
-          </a:p>
-          <a:p>
-            <a:r>
-              <a:rPr lang="fr-FR" b="1" dirty="0" smtClean="0">
-                <a:solidFill>
-                  <a:srgbClr val="000099"/>
-                </a:solidFill>
-                <a:latin typeface="Courier New" pitchFamily="49" charset="0"/>
-                <a:cs typeface="Courier New" pitchFamily="49" charset="0"/>
-              </a:rPr>
-              <a:t>  </a:t>
-            </a:r>
-            <a:r>
-              <a:rPr lang="fr-FR" b="1" dirty="0" err="1" smtClean="0">
-                <a:solidFill>
-                  <a:srgbClr val="000099"/>
-                </a:solidFill>
-                <a:latin typeface="Courier New" pitchFamily="49" charset="0"/>
-                <a:cs typeface="Courier New" pitchFamily="49" charset="0"/>
-              </a:rPr>
-              <a:t>private</a:t>
-            </a:r>
-            <a:r>
-              <a:rPr lang="fr-FR" b="1" dirty="0" smtClean="0">
-                <a:solidFill>
-                  <a:srgbClr val="000099"/>
-                </a:solidFill>
-                <a:latin typeface="Courier New" pitchFamily="49" charset="0"/>
-                <a:cs typeface="Courier New" pitchFamily="49" charset="0"/>
-              </a:rPr>
-              <a:t> Date </a:t>
-            </a:r>
-            <a:r>
-              <a:rPr lang="fr-FR" b="1" dirty="0" err="1" smtClean="0">
-                <a:solidFill>
-                  <a:srgbClr val="000099"/>
-                </a:solidFill>
-                <a:latin typeface="Courier New" pitchFamily="49" charset="0"/>
-                <a:cs typeface="Courier New" pitchFamily="49" charset="0"/>
-              </a:rPr>
-              <a:t>modificationTimestamp</a:t>
-            </a:r>
-            <a:r>
-              <a:rPr lang="fr-FR" b="1" dirty="0" smtClean="0">
-                <a:solidFill>
-                  <a:srgbClr val="000099"/>
-                </a:solidFill>
-                <a:latin typeface="Courier New" pitchFamily="49" charset="0"/>
-                <a:cs typeface="Courier New" pitchFamily="49" charset="0"/>
-              </a:rPr>
-              <a:t>;;</a:t>
-            </a:r>
+            <a:endParaRPr lang="en-US" b="1" dirty="0" smtClean="0">
+              <a:solidFill>
+                <a:srgbClr val="000099"/>
+              </a:solidFill>
+              <a:latin typeface="Courier New" pitchFamily="49" charset="0"/>
+              <a:cs typeface="Courier New" pitchFamily="49" charset="0"/>
+            </a:endParaRPr>
           </a:p>
           <a:p>
             <a:r>
@@ -9692,62 +9546,27 @@
                 <a:latin typeface="Courier New" pitchFamily="49" charset="0"/>
                 <a:cs typeface="Courier New" pitchFamily="49" charset="0"/>
               </a:rPr>
-              <a:t>  private final String </a:t>
-            </a:r>
-            <a:r>
-              <a:rPr lang="en-US" b="1" dirty="0" err="1" smtClean="0">
-                <a:solidFill>
-                  <a:srgbClr val="000099"/>
-                </a:solidFill>
-                <a:latin typeface="Courier New" pitchFamily="49" charset="0"/>
-                <a:cs typeface="Courier New" pitchFamily="49" charset="0"/>
-              </a:rPr>
-              <a:t>recordId</a:t>
-            </a:r>
-            <a:r>
-              <a:rPr lang="en-US" b="1" dirty="0" smtClean="0">
-                <a:solidFill>
-                  <a:srgbClr val="000099"/>
-                </a:solidFill>
-                <a:latin typeface="Courier New" pitchFamily="49" charset="0"/>
-                <a:cs typeface="Courier New" pitchFamily="49" charset="0"/>
-              </a:rPr>
-              <a:t> = "102";</a:t>
-            </a:r>
-          </a:p>
-          <a:p>
-            <a:r>
-              <a:rPr lang="en-US" b="1" dirty="0" smtClean="0">
-                <a:solidFill>
-                  <a:srgbClr val="000099"/>
-                </a:solidFill>
-                <a:latin typeface="Courier New" pitchFamily="49" charset="0"/>
-                <a:cs typeface="Courier New" pitchFamily="49" charset="0"/>
-              </a:rPr>
-              <a:t>  </a:t>
-            </a:r>
-            <a:r>
-              <a:rPr lang="el-GR" b="1" dirty="0" smtClean="0">
-                <a:solidFill>
-                  <a:srgbClr val="000099"/>
-                </a:solidFill>
-                <a:latin typeface="Courier New" pitchFamily="49" charset="0"/>
-                <a:cs typeface="Courier New" pitchFamily="49" charset="0"/>
-              </a:rPr>
-              <a:t>/* ... */</a:t>
-            </a:r>
-          </a:p>
-          <a:p>
-            <a:r>
-              <a:rPr lang="el-GR" b="1" dirty="0" smtClean="0">
-                <a:solidFill>
-                  <a:srgbClr val="000099"/>
-                </a:solidFill>
-                <a:latin typeface="Courier New" pitchFamily="49" charset="0"/>
-                <a:cs typeface="Courier New" pitchFamily="49" charset="0"/>
-              </a:rPr>
-              <a:t>};</a:t>
-            </a:r>
+              <a:t>Date </a:t>
+            </a:r>
+            <a:r>
+              <a:rPr lang="en-US" b="1" smtClean="0">
+                <a:solidFill>
+                  <a:srgbClr val="000099"/>
+                </a:solidFill>
+                <a:latin typeface="Courier New" pitchFamily="49" charset="0"/>
+                <a:cs typeface="Courier New" pitchFamily="49" charset="0"/>
+              </a:rPr>
+              <a:t>modificationTimestamp;</a:t>
+            </a:r>
+            <a:endParaRPr lang="en-US" b="1" dirty="0" smtClean="0">
+              <a:solidFill>
+                <a:srgbClr val="000099"/>
+              </a:solidFill>
+              <a:latin typeface="Courier New" pitchFamily="49" charset="0"/>
+              <a:cs typeface="Courier New" pitchFamily="49" charset="0"/>
+            </a:endParaRPr>
+          </a:p>
+          <a:p>
             <a:endParaRPr lang="en-US" b="1" dirty="0" smtClean="0">
               <a:solidFill>
                 <a:srgbClr val="000099"/>

</xml_diff>